<commit_message>
comparison to existing work added to pp
</commit_message>
<xml_diff>
--- a/AI_2_Presentation.pptx
+++ b/AI_2_Presentation.pptx
@@ -263,11 +263,11 @@
           <c:showBubbleSize val="0"/>
         </c:dLbls>
         <c:smooth val="0"/>
-        <c:axId val="354568808"/>
-        <c:axId val="354562144"/>
+        <c:axId val="261433240"/>
+        <c:axId val="261431280"/>
       </c:lineChart>
       <c:catAx>
-        <c:axId val="354568808"/>
+        <c:axId val="261433240"/>
         <c:scaling>
           <c:orientation val="minMax"/>
         </c:scaling>
@@ -310,7 +310,7 @@
             <a:endParaRPr lang="en-US"/>
           </a:p>
         </c:txPr>
-        <c:crossAx val="354562144"/>
+        <c:crossAx val="261431280"/>
         <c:crosses val="autoZero"/>
         <c:auto val="1"/>
         <c:lblAlgn val="ctr"/>
@@ -318,7 +318,7 @@
         <c:noMultiLvlLbl val="0"/>
       </c:catAx>
       <c:valAx>
-        <c:axId val="354562144"/>
+        <c:axId val="261431280"/>
         <c:scaling>
           <c:orientation val="minMax"/>
         </c:scaling>
@@ -369,7 +369,7 @@
             <a:endParaRPr lang="en-US"/>
           </a:p>
         </c:txPr>
-        <c:crossAx val="354568808"/>
+        <c:crossAx val="261433240"/>
         <c:crosses val="autoZero"/>
         <c:crossBetween val="between"/>
       </c:valAx>
@@ -576,11 +576,11 @@
           <c:showBubbleSize val="0"/>
         </c:dLbls>
         <c:smooth val="0"/>
-        <c:axId val="389660216"/>
-        <c:axId val="520683912"/>
+        <c:axId val="261429320"/>
+        <c:axId val="261428144"/>
       </c:lineChart>
       <c:catAx>
-        <c:axId val="389660216"/>
+        <c:axId val="261429320"/>
         <c:scaling>
           <c:orientation val="minMax"/>
         </c:scaling>
@@ -623,7 +623,7 @@
             <a:endParaRPr lang="en-US"/>
           </a:p>
         </c:txPr>
-        <c:crossAx val="520683912"/>
+        <c:crossAx val="261428144"/>
         <c:crosses val="autoZero"/>
         <c:auto val="1"/>
         <c:lblAlgn val="ctr"/>
@@ -631,7 +631,7 @@
         <c:noMultiLvlLbl val="0"/>
       </c:catAx>
       <c:valAx>
-        <c:axId val="520683912"/>
+        <c:axId val="261428144"/>
         <c:scaling>
           <c:orientation val="minMax"/>
         </c:scaling>
@@ -682,7 +682,7 @@
             <a:endParaRPr lang="en-US"/>
           </a:p>
         </c:txPr>
-        <c:crossAx val="389660216"/>
+        <c:crossAx val="261429320"/>
         <c:crosses val="autoZero"/>
         <c:crossBetween val="between"/>
       </c:valAx>
@@ -1081,11 +1081,11 @@
           <c:showBubbleSize val="0"/>
         </c:dLbls>
         <c:smooth val="0"/>
-        <c:axId val="388736016"/>
-        <c:axId val="388732096"/>
+        <c:axId val="420785728"/>
+        <c:axId val="420781416"/>
       </c:lineChart>
       <c:catAx>
-        <c:axId val="388736016"/>
+        <c:axId val="420785728"/>
         <c:scaling>
           <c:orientation val="minMax"/>
         </c:scaling>
@@ -1128,7 +1128,7 @@
             <a:endParaRPr lang="en-US"/>
           </a:p>
         </c:txPr>
-        <c:crossAx val="388732096"/>
+        <c:crossAx val="420781416"/>
         <c:crosses val="autoZero"/>
         <c:auto val="1"/>
         <c:lblAlgn val="ctr"/>
@@ -1136,7 +1136,7 @@
         <c:noMultiLvlLbl val="0"/>
       </c:catAx>
       <c:valAx>
-        <c:axId val="388732096"/>
+        <c:axId val="420781416"/>
         <c:scaling>
           <c:orientation val="minMax"/>
         </c:scaling>
@@ -1187,7 +1187,7 @@
             <a:endParaRPr lang="en-US"/>
           </a:p>
         </c:txPr>
-        <c:crossAx val="388736016"/>
+        <c:crossAx val="420785728"/>
         <c:crosses val="autoZero"/>
         <c:crossBetween val="between"/>
       </c:valAx>
@@ -7429,15 +7429,7 @@
             </a:pPr>
             <a:r>
               <a:rPr lang="en-US" dirty="0" smtClean="0"/>
-              <a:t>Ex: 100 “words” of a “skid” </a:t>
-            </a:r>
-            <a:r>
-              <a:rPr lang="en-US" dirty="0" smtClean="0"/>
-              <a:t>mean </a:t>
-            </a:r>
-            <a:r>
-              <a:rPr lang="en-US" dirty="0" smtClean="0"/>
-              <a:t>less in a 300ms segment than it does a 50ms segment. </a:t>
+              <a:t>Ex: 100 “words” of a “skid” mean less in a 300ms segment than it does a 50ms segment. </a:t>
             </a:r>
             <a:endParaRPr lang="en-US" dirty="0"/>
           </a:p>
@@ -7664,59 +7656,229 @@
             <a:spLocks noGrp="1"/>
           </p:cNvSpPr>
           <p:nvPr>
-            <p:ph idx="1"/>
+            <p:ph sz="half" idx="1"/>
           </p:nvPr>
         </p:nvSpPr>
         <p:spPr/>
         <p:txBody>
-          <a:bodyPr/>
+          <a:bodyPr>
+            <a:normAutofit lnSpcReduction="10000"/>
+          </a:bodyPr>
           <a:lstStyle/>
           <a:p>
+            <a:pPr>
+              <a:spcAft>
+                <a:spcPts val="600"/>
+              </a:spcAft>
+              <a:buFont typeface="Wingdings" panose="05000000000000000000" pitchFamily="2" charset="2"/>
+              <a:buChar char="§"/>
+            </a:pPr>
             <a:r>
               <a:rPr lang="en-US" dirty="0" smtClean="0"/>
-              <a:t>Our work was mostly a replication experiment</a:t>
-            </a:r>
-          </a:p>
-          <a:p>
+              <a:t> Our </a:t>
+            </a:r>
             <a:r>
               <a:rPr lang="en-US" dirty="0" smtClean="0"/>
-              <a:t>Existing work focused more on the implications of a real world set up</a:t>
-            </a:r>
-          </a:p>
-          <a:p>
-            <a:pPr lvl="1"/>
+              <a:t>work was mostly </a:t>
+            </a:r>
+            <a:r>
+              <a:rPr lang="en-US" dirty="0" smtClean="0"/>
+              <a:t>an experiment to replicate an already existing study [1]. </a:t>
+            </a:r>
+            <a:endParaRPr lang="en-US" dirty="0" smtClean="0"/>
+          </a:p>
+          <a:p>
+            <a:pPr>
+              <a:spcAft>
+                <a:spcPts val="600"/>
+              </a:spcAft>
+              <a:buFont typeface="Wingdings" panose="05000000000000000000" pitchFamily="2" charset="2"/>
+              <a:buChar char="§"/>
+            </a:pPr>
+            <a:r>
+              <a:rPr lang="en-US" dirty="0" smtClean="0"/>
+              <a:t> Existing </a:t>
+            </a:r>
+            <a:r>
+              <a:rPr lang="en-US" dirty="0" smtClean="0"/>
+              <a:t>work focused more on the implications of a real world set up</a:t>
+            </a:r>
+          </a:p>
+          <a:p>
+            <a:pPr lvl="1">
+              <a:spcAft>
+                <a:spcPts val="600"/>
+              </a:spcAft>
+              <a:buFont typeface="Wingdings" panose="05000000000000000000" pitchFamily="2" charset="2"/>
+              <a:buChar char="§"/>
+            </a:pPr>
             <a:r>
               <a:rPr lang="en-US" dirty="0" smtClean="0"/>
               <a:t>Reducing the </a:t>
             </a:r>
             <a:r>
-              <a:rPr lang="en-US" dirty="0" err="1" smtClean="0"/>
-              <a:t>db</a:t>
-            </a:r>
-            <a:r>
               <a:rPr lang="en-US" dirty="0" smtClean="0"/>
-              <a:t> of the .wav file to make it harder to recognize</a:t>
-            </a:r>
-          </a:p>
-          <a:p>
-            <a:pPr lvl="1"/>
+              <a:t>decibels </a:t>
+            </a:r>
+            <a:r>
+              <a:rPr lang="en-US" dirty="0" smtClean="0"/>
+              <a:t>of the .wav file to make it harder to recognize</a:t>
+            </a:r>
+          </a:p>
+          <a:p>
+            <a:pPr lvl="1">
+              <a:spcAft>
+                <a:spcPts val="600"/>
+              </a:spcAft>
+              <a:buFont typeface="Wingdings" panose="05000000000000000000" pitchFamily="2" charset="2"/>
+              <a:buChar char="§"/>
+            </a:pPr>
             <a:r>
               <a:rPr lang="en-US" dirty="0" smtClean="0"/>
               <a:t>Analyzing microphone placement</a:t>
             </a:r>
           </a:p>
           <a:p>
+            <a:pPr>
+              <a:spcAft>
+                <a:spcPts val="600"/>
+              </a:spcAft>
+              <a:buFont typeface="Wingdings" panose="05000000000000000000" pitchFamily="2" charset="2"/>
+              <a:buChar char="§"/>
+            </a:pPr>
             <a:r>
               <a:rPr lang="en-US" dirty="0" smtClean="0"/>
-              <a:t>Our SVM actually outperformed theirs, even with their 0db loss classification</a:t>
-            </a:r>
-          </a:p>
-          <a:p>
-            <a:pPr lvl="1"/>
+              <a:t> Our </a:t>
+            </a:r>
             <a:r>
               <a:rPr lang="en-US" dirty="0" smtClean="0"/>
-              <a:t>Maybe we tuned our parameters more than theirs? </a:t>
-            </a:r>
+              <a:t>SVM actually outperformed </a:t>
+            </a:r>
+            <a:r>
+              <a:rPr lang="en-US" dirty="0" smtClean="0"/>
+              <a:t>theirs, </a:t>
+            </a:r>
+            <a:r>
+              <a:rPr lang="en-US" dirty="0" smtClean="0"/>
+              <a:t>even with their </a:t>
+            </a:r>
+            <a:r>
+              <a:rPr lang="en-US" dirty="0" smtClean="0"/>
+              <a:t>0dB </a:t>
+            </a:r>
+            <a:r>
+              <a:rPr lang="en-US" dirty="0" smtClean="0"/>
+              <a:t>loss </a:t>
+            </a:r>
+            <a:r>
+              <a:rPr lang="en-US" dirty="0" smtClean="0"/>
+              <a:t>classification.</a:t>
+            </a:r>
+            <a:endParaRPr lang="en-US" dirty="0" smtClean="0"/>
+          </a:p>
+          <a:p>
+            <a:pPr lvl="1">
+              <a:spcAft>
+                <a:spcPts val="600"/>
+              </a:spcAft>
+              <a:buFont typeface="Wingdings" panose="05000000000000000000" pitchFamily="2" charset="2"/>
+              <a:buChar char="§"/>
+            </a:pPr>
+            <a:r>
+              <a:rPr lang="en-US" dirty="0" smtClean="0"/>
+              <a:t>We possibly did better parameter tuning. </a:t>
+            </a:r>
+          </a:p>
+          <a:p>
+            <a:pPr lvl="1">
+              <a:spcAft>
+                <a:spcPts val="600"/>
+              </a:spcAft>
+              <a:buFont typeface="Wingdings" panose="05000000000000000000" pitchFamily="2" charset="2"/>
+              <a:buChar char="§"/>
+            </a:pPr>
+            <a:r>
+              <a:rPr lang="en-US" dirty="0" smtClean="0"/>
+              <a:t>They used n = 4 folds for cross-validation</a:t>
+            </a:r>
+          </a:p>
+          <a:p>
+            <a:pPr lvl="1">
+              <a:spcAft>
+                <a:spcPts val="600"/>
+              </a:spcAft>
+              <a:buFont typeface="Wingdings" panose="05000000000000000000" pitchFamily="2" charset="2"/>
+              <a:buChar char="§"/>
+            </a:pPr>
+            <a:r>
+              <a:rPr lang="en-US" dirty="0" smtClean="0"/>
+              <a:t>We used n = 10 folds</a:t>
+            </a:r>
+          </a:p>
+        </p:txBody>
+      </p:sp>
+      <p:pic>
+        <p:nvPicPr>
+          <p:cNvPr id="5" name="Content Placeholder 4"/>
+          <p:cNvPicPr>
+            <a:picLocks noGrp="1" noChangeAspect="1"/>
+          </p:cNvPicPr>
+          <p:nvPr>
+            <p:ph sz="half" idx="2"/>
+          </p:nvPr>
+        </p:nvPicPr>
+        <p:blipFill>
+          <a:blip r:embed="rId2"/>
+          <a:stretch>
+            <a:fillRect/>
+          </a:stretch>
+        </p:blipFill>
+        <p:spPr>
+          <a:xfrm>
+            <a:off x="6331225" y="1845734"/>
+            <a:ext cx="4915895" cy="3533299"/>
+          </a:xfrm>
+          <a:prstGeom prst="rect">
+            <a:avLst/>
+          </a:prstGeom>
+        </p:spPr>
+      </p:pic>
+      <p:sp>
+        <p:nvSpPr>
+          <p:cNvPr id="6" name="TextBox 5"/>
+          <p:cNvSpPr txBox="1"/>
+          <p:nvPr/>
+        </p:nvSpPr>
+        <p:spPr>
+          <a:xfrm>
+            <a:off x="7022592" y="5477256"/>
+            <a:ext cx="3904488" cy="523220"/>
+          </a:xfrm>
+          <a:prstGeom prst="rect">
+            <a:avLst/>
+          </a:prstGeom>
+          <a:noFill/>
+        </p:spPr>
+        <p:txBody>
+          <a:bodyPr wrap="square" rtlCol="0">
+            <a:spAutoFit/>
+          </a:bodyPr>
+          <a:lstStyle/>
+          <a:p>
+            <a:pPr algn="ctr"/>
+            <a:r>
+              <a:rPr lang="en-US" sz="1400" dirty="0" smtClean="0"/>
+              <a:t>[1]: Recognition rate vs </a:t>
+            </a:r>
+            <a:r>
+              <a:rPr lang="en-US" sz="1400" dirty="0" err="1" smtClean="0"/>
+              <a:t>kmeans</a:t>
+            </a:r>
+            <a:r>
+              <a:rPr lang="en-US" sz="1400" dirty="0" smtClean="0"/>
+              <a:t> clusters in the source paper.</a:t>
+            </a:r>
+            <a:endParaRPr lang="en-US" sz="1400" dirty="0"/>
           </a:p>
         </p:txBody>
       </p:sp>

</xml_diff>

<commit_message>
Added some text to the powerpoint
</commit_message>
<xml_diff>
--- a/AI_2_Presentation.pptx
+++ b/AI_2_Presentation.pptx
@@ -263,11 +263,11 @@
           <c:showBubbleSize val="0"/>
         </c:dLbls>
         <c:smooth val="0"/>
-        <c:axId val="407886624"/>
-        <c:axId val="345130832"/>
+        <c:axId val="154497424"/>
+        <c:axId val="154497984"/>
       </c:lineChart>
       <c:catAx>
-        <c:axId val="407886624"/>
+        <c:axId val="154497424"/>
         <c:scaling>
           <c:orientation val="minMax"/>
         </c:scaling>
@@ -310,7 +310,7 @@
             <a:endParaRPr lang="en-US"/>
           </a:p>
         </c:txPr>
-        <c:crossAx val="345130832"/>
+        <c:crossAx val="154497984"/>
         <c:crosses val="autoZero"/>
         <c:auto val="1"/>
         <c:lblAlgn val="ctr"/>
@@ -318,7 +318,7 @@
         <c:noMultiLvlLbl val="0"/>
       </c:catAx>
       <c:valAx>
-        <c:axId val="345130832"/>
+        <c:axId val="154497984"/>
         <c:scaling>
           <c:orientation val="minMax"/>
         </c:scaling>
@@ -369,7 +369,7 @@
             <a:endParaRPr lang="en-US"/>
           </a:p>
         </c:txPr>
-        <c:crossAx val="407886624"/>
+        <c:crossAx val="154497424"/>
         <c:crosses val="autoZero"/>
         <c:crossBetween val="between"/>
       </c:valAx>
@@ -576,11 +576,11 @@
           <c:showBubbleSize val="0"/>
         </c:dLbls>
         <c:smooth val="0"/>
-        <c:axId val="408799416"/>
-        <c:axId val="408796672"/>
+        <c:axId val="154608512"/>
+        <c:axId val="240726480"/>
       </c:lineChart>
       <c:catAx>
-        <c:axId val="408799416"/>
+        <c:axId val="154608512"/>
         <c:scaling>
           <c:orientation val="minMax"/>
         </c:scaling>
@@ -623,7 +623,7 @@
             <a:endParaRPr lang="en-US"/>
           </a:p>
         </c:txPr>
-        <c:crossAx val="408796672"/>
+        <c:crossAx val="240726480"/>
         <c:crosses val="autoZero"/>
         <c:auto val="1"/>
         <c:lblAlgn val="ctr"/>
@@ -631,7 +631,7 @@
         <c:noMultiLvlLbl val="0"/>
       </c:catAx>
       <c:valAx>
-        <c:axId val="408796672"/>
+        <c:axId val="240726480"/>
         <c:scaling>
           <c:orientation val="minMax"/>
         </c:scaling>
@@ -682,7 +682,7 @@
             <a:endParaRPr lang="en-US"/>
           </a:p>
         </c:txPr>
-        <c:crossAx val="408799416"/>
+        <c:crossAx val="154608512"/>
         <c:crosses val="autoZero"/>
         <c:crossBetween val="between"/>
       </c:valAx>
@@ -1081,11 +1081,11 @@
           <c:showBubbleSize val="0"/>
         </c:dLbls>
         <c:smooth val="0"/>
-        <c:axId val="408793144"/>
-        <c:axId val="408797456"/>
+        <c:axId val="157647632"/>
+        <c:axId val="157648192"/>
       </c:lineChart>
       <c:catAx>
-        <c:axId val="408793144"/>
+        <c:axId val="157647632"/>
         <c:scaling>
           <c:orientation val="minMax"/>
         </c:scaling>
@@ -1128,7 +1128,7 @@
             <a:endParaRPr lang="en-US"/>
           </a:p>
         </c:txPr>
-        <c:crossAx val="408797456"/>
+        <c:crossAx val="157648192"/>
         <c:crosses val="autoZero"/>
         <c:auto val="1"/>
         <c:lblAlgn val="ctr"/>
@@ -1136,7 +1136,7 @@
         <c:noMultiLvlLbl val="0"/>
       </c:catAx>
       <c:valAx>
-        <c:axId val="408797456"/>
+        <c:axId val="157648192"/>
         <c:scaling>
           <c:orientation val="minMax"/>
         </c:scaling>
@@ -1187,7 +1187,7 @@
             <a:endParaRPr lang="en-US"/>
           </a:p>
         </c:txPr>
-        <c:crossAx val="408793144"/>
+        <c:crossAx val="157647632"/>
         <c:crosses val="autoZero"/>
         <c:crossBetween val="between"/>
       </c:valAx>
@@ -7274,7 +7274,11 @@
             </a:pPr>
             <a:r>
               <a:rPr lang="en-US" dirty="0" smtClean="0"/>
-              <a:t>Ex: 100 “words” of a “skid” mean less in a 300ms segment than it does a 50ms segment. </a:t>
+              <a:t>Ex: </a:t>
+            </a:r>
+            <a:r>
+              <a:rPr lang="en-US" dirty="0" smtClean="0"/>
+              <a:t>100 “words” of a “skid” mean less when the words are 300ms segments as opposed to 50ms segments. </a:t>
             </a:r>
             <a:endParaRPr lang="en-US" dirty="0"/>
           </a:p>
@@ -7649,11 +7653,7 @@
             </a:r>
             <a:r>
               <a:rPr lang="en-US" sz="1400" dirty="0" smtClean="0"/>
-              <a:t> clusters in the source </a:t>
-            </a:r>
-            <a:r>
-              <a:rPr lang="en-US" sz="1400" dirty="0" smtClean="0"/>
-              <a:t>paper. The red line is 0dB loss. </a:t>
+              <a:t> clusters in the source paper. The red line is 0dB loss. </a:t>
             </a:r>
             <a:endParaRPr lang="en-US" sz="1400" dirty="0"/>
           </a:p>
@@ -7812,7 +7812,6 @@
               <a:rPr lang="en-US" dirty="0"/>
               <a:t>1, 279-288.</a:t>
             </a:r>
-            <a:endParaRPr lang="en-US" dirty="0"/>
           </a:p>
         </p:txBody>
       </p:sp>
@@ -8226,7 +8225,7 @@
               </p:nextCondLst>
             </p:seq>
             <p:audio>
-              <p:cMediaNode vol="80000">
+              <p:cMediaNode vol="31707">
                 <p:cTn id="7" fill="hold" display="0">
                   <p:stCondLst>
                     <p:cond delay="indefinite"/>
@@ -8340,8 +8339,23 @@
             </a:pPr>
             <a:r>
               <a:rPr lang="en-US" dirty="0" smtClean="0"/>
-              <a:t>Cut each clip into frames</a:t>
-            </a:r>
+              <a:t>Cut each clip into </a:t>
+            </a:r>
+            <a:r>
+              <a:rPr lang="en-US" dirty="0" smtClean="0"/>
+              <a:t>frames</a:t>
+            </a:r>
+          </a:p>
+          <a:p>
+            <a:pPr lvl="1">
+              <a:buFont typeface="Arial" panose="020B0604020202020204" pitchFamily="34" charset="0"/>
+              <a:buChar char="•"/>
+            </a:pPr>
+            <a:r>
+              <a:rPr lang="en-US" dirty="0" smtClean="0"/>
+              <a:t>Example clip of crash on the right</a:t>
+            </a:r>
+            <a:endParaRPr lang="en-US" dirty="0" smtClean="0"/>
           </a:p>
           <a:p>
             <a:pPr>
@@ -8381,6 +8395,10 @@
           <a:bodyPr/>
           <a:lstStyle/>
           <a:p>
+            <a:r>
+              <a:rPr lang="en-US" dirty="0" smtClean="0"/>
+              <a:t>Graph of crash audio</a:t>
+            </a:r>
             <a:endParaRPr lang="en-US" dirty="0"/>
           </a:p>
         </p:txBody>
@@ -8400,7 +8418,7 @@
           <a:bodyPr/>
           <a:lstStyle/>
           <a:p>
-            <a:endParaRPr lang="en-US"/>
+            <a:endParaRPr lang="en-US" dirty="0"/>
           </a:p>
         </p:txBody>
       </p:sp>

</xml_diff>

<commit_message>
Added picture to powerpoint.
</commit_message>
<xml_diff>
--- a/AI_2_Presentation.pptx
+++ b/AI_2_Presentation.pptx
@@ -142,7 +142,6 @@
   </mc:AlternateContent>
   <c:chart>
     <c:title>
-      <c:layout/>
       <c:overlay val="0"/>
       <c:spPr>
         <a:noFill/>
@@ -263,11 +262,11 @@
           <c:showBubbleSize val="0"/>
         </c:dLbls>
         <c:smooth val="0"/>
-        <c:axId val="154497424"/>
-        <c:axId val="154497984"/>
+        <c:axId val="182881008"/>
+        <c:axId val="182881568"/>
       </c:lineChart>
       <c:catAx>
-        <c:axId val="154497424"/>
+        <c:axId val="182881008"/>
         <c:scaling>
           <c:orientation val="minMax"/>
         </c:scaling>
@@ -310,7 +309,7 @@
             <a:endParaRPr lang="en-US"/>
           </a:p>
         </c:txPr>
-        <c:crossAx val="154497984"/>
+        <c:crossAx val="182881568"/>
         <c:crosses val="autoZero"/>
         <c:auto val="1"/>
         <c:lblAlgn val="ctr"/>
@@ -318,7 +317,7 @@
         <c:noMultiLvlLbl val="0"/>
       </c:catAx>
       <c:valAx>
-        <c:axId val="154497984"/>
+        <c:axId val="182881568"/>
         <c:scaling>
           <c:orientation val="minMax"/>
         </c:scaling>
@@ -369,7 +368,7 @@
             <a:endParaRPr lang="en-US"/>
           </a:p>
         </c:txPr>
-        <c:crossAx val="154497424"/>
+        <c:crossAx val="182881008"/>
         <c:crosses val="autoZero"/>
         <c:crossBetween val="between"/>
       </c:valAx>
@@ -383,7 +382,6 @@
     </c:plotArea>
     <c:legend>
       <c:legendPos val="b"/>
-      <c:layout/>
       <c:overlay val="0"/>
       <c:spPr>
         <a:noFill/>
@@ -455,7 +453,6 @@
   </mc:AlternateContent>
   <c:chart>
     <c:title>
-      <c:layout/>
       <c:overlay val="0"/>
       <c:spPr>
         <a:noFill/>
@@ -576,11 +573,11 @@
           <c:showBubbleSize val="0"/>
         </c:dLbls>
         <c:smooth val="0"/>
-        <c:axId val="154608512"/>
-        <c:axId val="240726480"/>
+        <c:axId val="182882688"/>
+        <c:axId val="182883248"/>
       </c:lineChart>
       <c:catAx>
-        <c:axId val="154608512"/>
+        <c:axId val="182882688"/>
         <c:scaling>
           <c:orientation val="minMax"/>
         </c:scaling>
@@ -623,7 +620,7 @@
             <a:endParaRPr lang="en-US"/>
           </a:p>
         </c:txPr>
-        <c:crossAx val="240726480"/>
+        <c:crossAx val="182883248"/>
         <c:crosses val="autoZero"/>
         <c:auto val="1"/>
         <c:lblAlgn val="ctr"/>
@@ -631,7 +628,7 @@
         <c:noMultiLvlLbl val="0"/>
       </c:catAx>
       <c:valAx>
-        <c:axId val="240726480"/>
+        <c:axId val="182883248"/>
         <c:scaling>
           <c:orientation val="minMax"/>
         </c:scaling>
@@ -682,7 +679,7 @@
             <a:endParaRPr lang="en-US"/>
           </a:p>
         </c:txPr>
-        <c:crossAx val="154608512"/>
+        <c:crossAx val="182882688"/>
         <c:crosses val="autoZero"/>
         <c:crossBetween val="between"/>
       </c:valAx>
@@ -696,7 +693,6 @@
     </c:plotArea>
     <c:legend>
       <c:legendPos val="b"/>
-      <c:layout/>
       <c:overlay val="0"/>
       <c:spPr>
         <a:noFill/>
@@ -798,7 +794,6 @@
           </a:p>
         </c:rich>
       </c:tx>
-      <c:layout/>
       <c:overlay val="0"/>
       <c:spPr>
         <a:noFill/>
@@ -1081,11 +1076,11 @@
           <c:showBubbleSize val="0"/>
         </c:dLbls>
         <c:smooth val="0"/>
-        <c:axId val="157647632"/>
-        <c:axId val="157648192"/>
+        <c:axId val="179016256"/>
+        <c:axId val="179016816"/>
       </c:lineChart>
       <c:catAx>
-        <c:axId val="157647632"/>
+        <c:axId val="179016256"/>
         <c:scaling>
           <c:orientation val="minMax"/>
         </c:scaling>
@@ -1128,7 +1123,7 @@
             <a:endParaRPr lang="en-US"/>
           </a:p>
         </c:txPr>
-        <c:crossAx val="157648192"/>
+        <c:crossAx val="179016816"/>
         <c:crosses val="autoZero"/>
         <c:auto val="1"/>
         <c:lblAlgn val="ctr"/>
@@ -1136,7 +1131,7 @@
         <c:noMultiLvlLbl val="0"/>
       </c:catAx>
       <c:valAx>
-        <c:axId val="157648192"/>
+        <c:axId val="179016816"/>
         <c:scaling>
           <c:orientation val="minMax"/>
         </c:scaling>
@@ -1187,7 +1182,7 @@
             <a:endParaRPr lang="en-US"/>
           </a:p>
         </c:txPr>
-        <c:crossAx val="157647632"/>
+        <c:crossAx val="179016256"/>
         <c:crosses val="autoZero"/>
         <c:crossBetween val="between"/>
       </c:valAx>
@@ -1201,7 +1196,6 @@
     </c:plotArea>
     <c:legend>
       <c:legendPos val="b"/>
-      <c:layout/>
       <c:overlay val="0"/>
       <c:spPr>
         <a:noFill/>
@@ -7274,11 +7268,7 @@
             </a:pPr>
             <a:r>
               <a:rPr lang="en-US" dirty="0" smtClean="0"/>
-              <a:t>Ex: </a:t>
-            </a:r>
-            <a:r>
-              <a:rPr lang="en-US" dirty="0" smtClean="0"/>
-              <a:t>100 “words” of a “skid” mean less when the words are 300ms segments as opposed to 50ms segments. </a:t>
+              <a:t>Ex: 100 “words” of a “skid” mean less when the words are 300ms segments as opposed to 50ms segments. </a:t>
             </a:r>
             <a:endParaRPr lang="en-US" dirty="0"/>
           </a:p>
@@ -8113,8 +8103,16 @@
           <a:lstStyle/>
           <a:p>
             <a:r>
-              <a:rPr lang="en-US" dirty="0" smtClean="0"/>
-              <a:t>Example clip</a:t>
+              <a:rPr lang="en-US" smtClean="0"/>
+              <a:t>Example </a:t>
+            </a:r>
+            <a:r>
+              <a:rPr lang="en-US" smtClean="0"/>
+              <a:t>Audio </a:t>
+            </a:r>
+            <a:r>
+              <a:rPr lang="en-US" smtClean="0"/>
+              <a:t>clip</a:t>
             </a:r>
             <a:endParaRPr lang="en-US" dirty="0"/>
           </a:p>
@@ -8339,11 +8337,7 @@
             </a:pPr>
             <a:r>
               <a:rPr lang="en-US" dirty="0" smtClean="0"/>
-              <a:t>Cut each clip into </a:t>
-            </a:r>
-            <a:r>
-              <a:rPr lang="en-US" dirty="0" smtClean="0"/>
-              <a:t>frames</a:t>
+              <a:t>Cut each clip into frames</a:t>
             </a:r>
           </a:p>
           <a:p>
@@ -8355,7 +8349,6 @@
               <a:rPr lang="en-US" dirty="0" smtClean="0"/>
               <a:t>Example clip of crash on the right</a:t>
             </a:r>
-            <a:endParaRPr lang="en-US" dirty="0" smtClean="0"/>
           </a:p>
           <a:p>
             <a:pPr>
@@ -8403,25 +8396,35 @@
           </a:p>
         </p:txBody>
       </p:sp>
-      <p:sp>
-        <p:nvSpPr>
-          <p:cNvPr id="6" name="Content Placeholder 5"/>
-          <p:cNvSpPr>
-            <a:spLocks noGrp="1"/>
-          </p:cNvSpPr>
+      <p:pic>
+        <p:nvPicPr>
+          <p:cNvPr id="7" name="Content Placeholder 6"/>
+          <p:cNvPicPr>
+            <a:picLocks noGrp="1" noChangeAspect="1"/>
+          </p:cNvPicPr>
           <p:nvPr>
             <p:ph sz="quarter" idx="4"/>
           </p:nvPr>
-        </p:nvSpPr>
-        <p:spPr/>
-        <p:txBody>
-          <a:bodyPr/>
-          <a:lstStyle/>
-          <a:p>
-            <a:endParaRPr lang="en-US" dirty="0"/>
-          </a:p>
-        </p:txBody>
-      </p:sp>
+        </p:nvPicPr>
+        <p:blipFill>
+          <a:blip r:embed="rId2">
+            <a:extLst>
+              <a:ext uri="{28A0092B-C50C-407E-A947-70E740481C1C}">
+                <a14:useLocalDpi xmlns:a14="http://schemas.microsoft.com/office/drawing/2010/main" val="0"/>
+              </a:ext>
+            </a:extLst>
+          </a:blip>
+          <a:stretch>
+            <a:fillRect/>
+          </a:stretch>
+        </p:blipFill>
+        <p:spPr>
+          <a:xfrm>
+            <a:off x="6218238" y="2691026"/>
+            <a:ext cx="4937125" cy="2568361"/>
+          </a:xfrm>
+        </p:spPr>
+      </p:pic>
     </p:spTree>
     <p:extLst>
       <p:ext uri="{BB962C8B-B14F-4D97-AF65-F5344CB8AC3E}">

</xml_diff>

<commit_message>
remove thing about folds
</commit_message>
<xml_diff>
--- a/AI_2_Presentation.pptx
+++ b/AI_2_Presentation.pptx
@@ -262,11 +262,11 @@
           <c:showBubbleSize val="0"/>
         </c:dLbls>
         <c:smooth val="0"/>
-        <c:axId val="182881008"/>
-        <c:axId val="182881568"/>
+        <c:axId val="150171616"/>
+        <c:axId val="150878176"/>
       </c:lineChart>
       <c:catAx>
-        <c:axId val="182881008"/>
+        <c:axId val="150171616"/>
         <c:scaling>
           <c:orientation val="minMax"/>
         </c:scaling>
@@ -309,7 +309,7 @@
             <a:endParaRPr lang="en-US"/>
           </a:p>
         </c:txPr>
-        <c:crossAx val="182881568"/>
+        <c:crossAx val="150878176"/>
         <c:crosses val="autoZero"/>
         <c:auto val="1"/>
         <c:lblAlgn val="ctr"/>
@@ -317,7 +317,7 @@
         <c:noMultiLvlLbl val="0"/>
       </c:catAx>
       <c:valAx>
-        <c:axId val="182881568"/>
+        <c:axId val="150878176"/>
         <c:scaling>
           <c:orientation val="minMax"/>
         </c:scaling>
@@ -368,7 +368,7 @@
             <a:endParaRPr lang="en-US"/>
           </a:p>
         </c:txPr>
-        <c:crossAx val="182881008"/>
+        <c:crossAx val="150171616"/>
         <c:crosses val="autoZero"/>
         <c:crossBetween val="between"/>
       </c:valAx>
@@ -573,11 +573,11 @@
           <c:showBubbleSize val="0"/>
         </c:dLbls>
         <c:smooth val="0"/>
-        <c:axId val="182882688"/>
-        <c:axId val="182883248"/>
+        <c:axId val="150880416"/>
+        <c:axId val="150880976"/>
       </c:lineChart>
       <c:catAx>
-        <c:axId val="182882688"/>
+        <c:axId val="150880416"/>
         <c:scaling>
           <c:orientation val="minMax"/>
         </c:scaling>
@@ -620,7 +620,7 @@
             <a:endParaRPr lang="en-US"/>
           </a:p>
         </c:txPr>
-        <c:crossAx val="182883248"/>
+        <c:crossAx val="150880976"/>
         <c:crosses val="autoZero"/>
         <c:auto val="1"/>
         <c:lblAlgn val="ctr"/>
@@ -628,7 +628,7 @@
         <c:noMultiLvlLbl val="0"/>
       </c:catAx>
       <c:valAx>
-        <c:axId val="182883248"/>
+        <c:axId val="150880976"/>
         <c:scaling>
           <c:orientation val="minMax"/>
         </c:scaling>
@@ -679,7 +679,7 @@
             <a:endParaRPr lang="en-US"/>
           </a:p>
         </c:txPr>
-        <c:crossAx val="182882688"/>
+        <c:crossAx val="150880416"/>
         <c:crosses val="autoZero"/>
         <c:crossBetween val="between"/>
       </c:valAx>
@@ -1076,11 +1076,11 @@
           <c:showBubbleSize val="0"/>
         </c:dLbls>
         <c:smooth val="0"/>
-        <c:axId val="179016256"/>
-        <c:axId val="179016816"/>
+        <c:axId val="148624400"/>
+        <c:axId val="148624960"/>
       </c:lineChart>
       <c:catAx>
-        <c:axId val="179016256"/>
+        <c:axId val="148624400"/>
         <c:scaling>
           <c:orientation val="minMax"/>
         </c:scaling>
@@ -1123,7 +1123,7 @@
             <a:endParaRPr lang="en-US"/>
           </a:p>
         </c:txPr>
-        <c:crossAx val="179016816"/>
+        <c:crossAx val="148624960"/>
         <c:crosses val="autoZero"/>
         <c:auto val="1"/>
         <c:lblAlgn val="ctr"/>
@@ -1131,7 +1131,7 @@
         <c:noMultiLvlLbl val="0"/>
       </c:catAx>
       <c:valAx>
-        <c:axId val="179016816"/>
+        <c:axId val="148624960"/>
         <c:scaling>
           <c:orientation val="minMax"/>
         </c:scaling>
@@ -1182,7 +1182,7 @@
             <a:endParaRPr lang="en-US"/>
           </a:p>
         </c:txPr>
-        <c:crossAx val="179016256"/>
+        <c:crossAx val="148624400"/>
         <c:crosses val="autoZero"/>
         <c:crossBetween val="between"/>
       </c:valAx>
@@ -7934,22 +7934,17 @@
             </a:pPr>
             <a:r>
               <a:rPr lang="en-US" dirty="0" smtClean="0"/>
-              <a:t> Audio sampled at 32 kHz and saved as .wav files</a:t>
-            </a:r>
-          </a:p>
-          <a:p>
-            <a:pPr>
-              <a:lnSpc>
-                <a:spcPct val="150000"/>
-              </a:lnSpc>
-              <a:buFont typeface="Wingdings" panose="05000000000000000000" pitchFamily="2" charset="2"/>
-              <a:buChar char="§"/>
-            </a:pPr>
-            <a:r>
-              <a:rPr lang="en-US" dirty="0" smtClean="0"/>
-              <a:t> Data pre-divided into four completely independent folds</a:t>
-            </a:r>
-            <a:endParaRPr lang="en-US" dirty="0"/>
+              <a:t> Audio sampled at 32 kHz and saved as .</a:t>
+            </a:r>
+            <a:r>
+              <a:rPr lang="en-US" smtClean="0"/>
+              <a:t>wav </a:t>
+            </a:r>
+            <a:r>
+              <a:rPr lang="en-US" smtClean="0"/>
+              <a:t>files</a:t>
+            </a:r>
+            <a:endParaRPr lang="en-US" dirty="0" smtClean="0"/>
           </a:p>
         </p:txBody>
       </p:sp>
@@ -8104,15 +8099,7 @@
           <a:p>
             <a:r>
               <a:rPr lang="en-US" smtClean="0"/>
-              <a:t>Example </a:t>
-            </a:r>
-            <a:r>
-              <a:rPr lang="en-US" smtClean="0"/>
-              <a:t>Audio </a:t>
-            </a:r>
-            <a:r>
-              <a:rPr lang="en-US" smtClean="0"/>
-              <a:t>clip</a:t>
+              <a:t>Example Audio clip</a:t>
             </a:r>
             <a:endParaRPr lang="en-US" dirty="0"/>
           </a:p>

</xml_diff>

<commit_message>
Added some more info about MFCCs
</commit_message>
<xml_diff>
--- a/AI_2_Presentation.pptx
+++ b/AI_2_Presentation.pptx
@@ -262,11 +262,11 @@
           <c:showBubbleSize val="0"/>
         </c:dLbls>
         <c:smooth val="0"/>
-        <c:axId val="418868056"/>
-        <c:axId val="418867664"/>
+        <c:axId val="224877008"/>
+        <c:axId val="224880368"/>
       </c:lineChart>
       <c:catAx>
-        <c:axId val="418868056"/>
+        <c:axId val="224877008"/>
         <c:scaling>
           <c:orientation val="minMax"/>
         </c:scaling>
@@ -309,7 +309,7 @@
             <a:endParaRPr lang="en-US"/>
           </a:p>
         </c:txPr>
-        <c:crossAx val="418867664"/>
+        <c:crossAx val="224880368"/>
         <c:crosses val="autoZero"/>
         <c:auto val="1"/>
         <c:lblAlgn val="ctr"/>
@@ -317,7 +317,7 @@
         <c:noMultiLvlLbl val="0"/>
       </c:catAx>
       <c:valAx>
-        <c:axId val="418867664"/>
+        <c:axId val="224880368"/>
         <c:scaling>
           <c:orientation val="minMax"/>
         </c:scaling>
@@ -368,7 +368,7 @@
             <a:endParaRPr lang="en-US"/>
           </a:p>
         </c:txPr>
-        <c:crossAx val="418868056"/>
+        <c:crossAx val="224877008"/>
         <c:crosses val="autoZero"/>
         <c:crossBetween val="between"/>
       </c:valAx>
@@ -575,11 +575,11 @@
           <c:showBubbleSize val="0"/>
         </c:dLbls>
         <c:smooth val="0"/>
-        <c:axId val="418868840"/>
-        <c:axId val="418869232"/>
+        <c:axId val="223761584"/>
+        <c:axId val="171063472"/>
       </c:lineChart>
       <c:catAx>
-        <c:axId val="418868840"/>
+        <c:axId val="223761584"/>
         <c:scaling>
           <c:orientation val="minMax"/>
         </c:scaling>
@@ -622,7 +622,7 @@
             <a:endParaRPr lang="en-US"/>
           </a:p>
         </c:txPr>
-        <c:crossAx val="418869232"/>
+        <c:crossAx val="171063472"/>
         <c:crosses val="autoZero"/>
         <c:auto val="1"/>
         <c:lblAlgn val="ctr"/>
@@ -630,7 +630,7 @@
         <c:noMultiLvlLbl val="0"/>
       </c:catAx>
       <c:valAx>
-        <c:axId val="418869232"/>
+        <c:axId val="171063472"/>
         <c:scaling>
           <c:orientation val="minMax"/>
         </c:scaling>
@@ -681,7 +681,7 @@
             <a:endParaRPr lang="en-US"/>
           </a:p>
         </c:txPr>
-        <c:crossAx val="418868840"/>
+        <c:crossAx val="223761584"/>
         <c:crosses val="autoZero"/>
         <c:crossBetween val="between"/>
       </c:valAx>
@@ -1080,11 +1080,11 @@
           <c:showBubbleSize val="0"/>
         </c:dLbls>
         <c:smooth val="0"/>
-        <c:axId val="418870016"/>
-        <c:axId val="418870408"/>
+        <c:axId val="171066832"/>
+        <c:axId val="171067392"/>
       </c:lineChart>
       <c:catAx>
-        <c:axId val="418870016"/>
+        <c:axId val="171066832"/>
         <c:scaling>
           <c:orientation val="minMax"/>
         </c:scaling>
@@ -1127,7 +1127,7 @@
             <a:endParaRPr lang="en-US"/>
           </a:p>
         </c:txPr>
-        <c:crossAx val="418870408"/>
+        <c:crossAx val="171067392"/>
         <c:crosses val="autoZero"/>
         <c:auto val="1"/>
         <c:lblAlgn val="ctr"/>
@@ -1135,7 +1135,7 @@
         <c:noMultiLvlLbl val="0"/>
       </c:catAx>
       <c:valAx>
-        <c:axId val="418870408"/>
+        <c:axId val="171067392"/>
         <c:scaling>
           <c:orientation val="minMax"/>
         </c:scaling>
@@ -1186,7 +1186,7 @@
             <a:endParaRPr lang="en-US"/>
           </a:p>
         </c:txPr>
-        <c:crossAx val="418870016"/>
+        <c:crossAx val="171066832"/>
         <c:crosses val="autoZero"/>
         <c:crossBetween val="between"/>
       </c:valAx>
@@ -8165,7 +8165,47 @@
             </a:pPr>
             <a:r>
               <a:rPr lang="en-US" dirty="0" smtClean="0"/>
-              <a:t>Extracted the 13 lowest Mel-Cepstral Frequency Coefficients for each frame</a:t>
+              <a:t>Extracted the 13 lowest </a:t>
+            </a:r>
+            <a:r>
+              <a:rPr lang="en-US" dirty="0" smtClean="0"/>
+              <a:t>Mel-Frequency </a:t>
+            </a:r>
+            <a:r>
+              <a:rPr lang="en-US" dirty="0"/>
+              <a:t>Cepstral </a:t>
+            </a:r>
+            <a:r>
+              <a:rPr lang="en-US" dirty="0" smtClean="0"/>
+              <a:t>Coefficients </a:t>
+            </a:r>
+            <a:r>
+              <a:rPr lang="en-US" dirty="0" smtClean="0"/>
+              <a:t>for each </a:t>
+            </a:r>
+            <a:r>
+              <a:rPr lang="en-US" dirty="0" smtClean="0"/>
+              <a:t>frame</a:t>
+            </a:r>
+          </a:p>
+          <a:p>
+            <a:pPr lvl="1">
+              <a:buFont typeface="Arial" panose="020B0604020202020204" pitchFamily="34" charset="0"/>
+              <a:buChar char="•"/>
+            </a:pPr>
+            <a:r>
+              <a:rPr lang="en-US" dirty="0" smtClean="0"/>
+              <a:t>FFT -&gt; Filter into Frequency Ranges -&gt; Log -&gt; DCT</a:t>
+            </a:r>
+          </a:p>
+          <a:p>
+            <a:pPr lvl="1">
+              <a:buFont typeface="Arial" panose="020B0604020202020204" pitchFamily="34" charset="0"/>
+              <a:buChar char="•"/>
+            </a:pPr>
+            <a:r>
+              <a:rPr lang="en-US" dirty="0" smtClean="0"/>
+              <a:t>Get frequencies -&gt; Get ranges of frequencies -&gt; non-linear scaling to match human hearing -&gt; simplify features</a:t>
             </a:r>
             <a:endParaRPr lang="en-US" dirty="0"/>
           </a:p>
@@ -8697,11 +8737,7 @@
             </a:r>
             <a:r>
               <a:rPr lang="en-US" smtClean="0"/>
-              <a:t>classification </a:t>
-            </a:r>
-            <a:r>
-              <a:rPr lang="en-US" smtClean="0"/>
-              <a:t>per </a:t>
+              <a:t>classification per </a:t>
             </a:r>
             <a:r>
               <a:rPr lang="en-US" dirty="0" err="1" smtClean="0"/>

</xml_diff>